<commit_message>
Fixed some typos and updated the breakout information
</commit_message>
<xml_diff>
--- a/problem_statement/Challenge Problem 7-v2.pptx
+++ b/problem_statement/Challenge Problem 7-v2.pptx
@@ -523,11 +523,11 @@
           <c:showPercent val="0"/>
           <c:showBubbleSize val="0"/>
         </c:dLbls>
-        <c:axId val="78711808"/>
-        <c:axId val="78729984"/>
+        <c:axId val="34064640"/>
+        <c:axId val="34680832"/>
       </c:scatterChart>
       <c:valAx>
-        <c:axId val="78711808"/>
+        <c:axId val="34064640"/>
         <c:scaling>
           <c:orientation val="minMax"/>
         </c:scaling>
@@ -537,12 +537,12 @@
         <c:majorTickMark val="out"/>
         <c:minorTickMark val="none"/>
         <c:tickLblPos val="nextTo"/>
-        <c:crossAx val="78729984"/>
+        <c:crossAx val="34680832"/>
         <c:crosses val="autoZero"/>
         <c:crossBetween val="midCat"/>
       </c:valAx>
       <c:valAx>
-        <c:axId val="78729984"/>
+        <c:axId val="34680832"/>
         <c:scaling>
           <c:orientation val="minMax"/>
         </c:scaling>
@@ -578,7 +578,7 @@
         <c:majorTickMark val="out"/>
         <c:minorTickMark val="none"/>
         <c:tickLblPos val="nextTo"/>
-        <c:crossAx val="78711808"/>
+        <c:crossAx val="34064640"/>
         <c:crosses val="autoZero"/>
         <c:crossBetween val="midCat"/>
       </c:valAx>
@@ -676,7 +676,7 @@
             <a:fld id="{9E6BD383-960F-4311-92C8-B2CD992ECA1E}" type="datetimeFigureOut">
               <a:rPr lang="en-US" smtClean="0"/>
               <a:pPr/>
-              <a:t>1/18/2016</a:t>
+              <a:t>1/23/2016</a:t>
             </a:fld>
             <a:endParaRPr lang="en-US"/>
           </a:p>
@@ -2107,7 +2107,7 @@
           <a:p>
             <a:fld id="{10A2D9C9-303B-4AB5-84A1-F153B136A717}" type="datetime1">
               <a:rPr lang="en-US" smtClean="0"/>
-              <a:t>1/18/2016</a:t>
+              <a:t>1/23/2016</a:t>
             </a:fld>
             <a:endParaRPr lang="en-US"/>
           </a:p>
@@ -2322,7 +2322,7 @@
           <a:p>
             <a:fld id="{51197B75-BE7F-4272-B976-D1D1E7899D4A}" type="datetime1">
               <a:rPr lang="en-US" smtClean="0"/>
-              <a:t>1/18/2016</a:t>
+              <a:t>1/23/2016</a:t>
             </a:fld>
             <a:endParaRPr lang="en-US"/>
           </a:p>
@@ -2537,7 +2537,7 @@
           <a:p>
             <a:fld id="{FE47BF7B-1E73-43D8-84A6-C70A80555264}" type="datetime1">
               <a:rPr lang="en-US" smtClean="0"/>
-              <a:t>1/18/2016</a:t>
+              <a:t>1/23/2016</a:t>
             </a:fld>
             <a:endParaRPr lang="en-US"/>
           </a:p>
@@ -3026,7 +3026,7 @@
           <a:p>
             <a:fld id="{33CE1CC0-3F48-49CA-B6DD-2076A2849A7C}" type="datetime1">
               <a:rPr lang="en-US" smtClean="0"/>
-              <a:t>1/18/2016</a:t>
+              <a:t>1/23/2016</a:t>
             </a:fld>
             <a:endParaRPr lang="en-US"/>
           </a:p>
@@ -3307,7 +3307,7 @@
           <a:p>
             <a:fld id="{8ADFE6ED-759C-4698-956B-3902C4481DF3}" type="datetime1">
               <a:rPr lang="en-US" smtClean="0"/>
-              <a:t>1/18/2016</a:t>
+              <a:t>1/23/2016</a:t>
             </a:fld>
             <a:endParaRPr lang="en-US"/>
           </a:p>
@@ -3638,7 +3638,7 @@
           <a:p>
             <a:fld id="{B60BC632-6F8B-4847-A1F0-503D152A434F}" type="datetime1">
               <a:rPr lang="en-US" smtClean="0"/>
-              <a:t>1/18/2016</a:t>
+              <a:t>1/23/2016</a:t>
             </a:fld>
             <a:endParaRPr lang="en-US"/>
           </a:p>
@@ -4109,7 +4109,7 @@
           <a:p>
             <a:fld id="{A419F865-BE9A-48D4-9430-39E701FC316F}" type="datetime1">
               <a:rPr lang="en-US" smtClean="0"/>
-              <a:t>1/18/2016</a:t>
+              <a:t>1/23/2016</a:t>
             </a:fld>
             <a:endParaRPr lang="en-US"/>
           </a:p>
@@ -4264,7 +4264,7 @@
           <a:p>
             <a:fld id="{C0324990-2155-49D2-9872-32C6CA12C0AC}" type="datetime1">
               <a:rPr lang="en-US" smtClean="0"/>
-              <a:t>1/18/2016</a:t>
+              <a:t>1/23/2016</a:t>
             </a:fld>
             <a:endParaRPr lang="en-US"/>
           </a:p>
@@ -4388,7 +4388,7 @@
           <a:p>
             <a:fld id="{99CA6F97-ACCB-4A92-AD64-1D4E7596EBDF}" type="datetime1">
               <a:rPr lang="en-US" smtClean="0"/>
-              <a:t>1/18/2016</a:t>
+              <a:t>1/23/2016</a:t>
             </a:fld>
             <a:endParaRPr lang="en-US"/>
           </a:p>
@@ -4703,7 +4703,7 @@
           <a:p>
             <a:fld id="{DACDE28F-BBA8-4E5C-A8E7-150E9CCFEF2C}" type="datetime1">
               <a:rPr lang="en-US" smtClean="0"/>
-              <a:t>1/18/2016</a:t>
+              <a:t>1/23/2016</a:t>
             </a:fld>
             <a:endParaRPr lang="en-US"/>
           </a:p>
@@ -4994,7 +4994,7 @@
           <a:p>
             <a:fld id="{17158191-D514-4FE8-8753-B6BFF2D54D8A}" type="datetime1">
               <a:rPr lang="en-US" smtClean="0"/>
-              <a:t>1/18/2016</a:t>
+              <a:t>1/23/2016</a:t>
             </a:fld>
             <a:endParaRPr lang="en-US"/>
           </a:p>
@@ -5795,11 +5795,7 @@
             </a:br>
             <a:r>
               <a:rPr lang="en-US" dirty="0" smtClean="0"/>
-              <a:t>Influenza-Like </a:t>
-            </a:r>
-            <a:r>
-              <a:rPr lang="en-US" dirty="0" smtClean="0"/>
-              <a:t>Illnesses</a:t>
+              <a:t>Influenza-Like Illnesses</a:t>
             </a:r>
             <a:br>
               <a:rPr lang="en-US" dirty="0" smtClean="0"/>
@@ -7634,21 +7630,8 @@
             <a:pPr lvl="1"/>
             <a:r>
               <a:rPr lang="en-US" dirty="0" smtClean="0"/>
-              <a:t>weekly ILI prevalence </a:t>
-            </a:r>
-            <a:r>
-              <a:rPr lang="en-US" dirty="0" smtClean="0"/>
-              <a:t>for all counties in the </a:t>
-            </a:r>
-            <a:r>
-              <a:rPr lang="en-US" dirty="0" smtClean="0"/>
-              <a:t>Prediction </a:t>
-            </a:r>
-            <a:r>
-              <a:rPr lang="en-US" dirty="0" smtClean="0"/>
-              <a:t>Regions</a:t>
-            </a:r>
-            <a:endParaRPr lang="en-US" dirty="0" smtClean="0"/>
+              <a:t>weekly ILI prevalence for all counties in the Prediction Regions</a:t>
+            </a:r>
           </a:p>
           <a:p>
             <a:r>
@@ -7808,8 +7791,8 @@
           </a:p>
         </p:txBody>
       </p:sp>
-      <mc:AlternateContent xmlns:mc="http://schemas.openxmlformats.org/markup-compatibility/2006">
-        <mc:Choice xmlns:a14="http://schemas.microsoft.com/office/drawing/2010/main" Requires="a14">
+      <mc:AlternateContent xmlns:mc="http://schemas.openxmlformats.org/markup-compatibility/2006" xmlns:a14="http://schemas.microsoft.com/office/drawing/2010/main">
+        <mc:Choice Requires="a14">
           <p:sp>
             <p:nvSpPr>
               <p:cNvPr id="3" name="Content Placeholder 2"/>
@@ -7894,11 +7877,7 @@
                 <a:pPr lvl="1"/>
                 <a:r>
                   <a:rPr lang="en-US" dirty="0" smtClean="0"/>
-                  <a:t>County observations for </a:t>
-                </a:r>
-                <a:r>
-                  <a:rPr lang="en-US" dirty="0" smtClean="0"/>
-                  <a:t>week </a:t>
+                  <a:t>County observations for week </a:t>
                 </a:r>
                 <a14:m>
                   <m:oMath xmlns:m="http://schemas.openxmlformats.org/officeDocument/2006/math">
@@ -7934,7 +7913,7 @@
             </p:txBody>
           </p:sp>
         </mc:Choice>
-        <mc:Fallback>
+        <mc:Fallback xmlns="">
           <p:sp>
             <p:nvSpPr>
               <p:cNvPr id="3" name="Content Placeholder 2"/>
@@ -8447,10 +8426,10 @@
               <a:buChar char="•"/>
             </a:pPr>
             <a:r>
-              <a:rPr lang="en-US" b="1" dirty="0" smtClean="0"/>
+              <a:rPr lang="en-US" b="1" u="sng" dirty="0" smtClean="0"/>
               <a:t>Influenza</a:t>
             </a:r>
-            <a:endParaRPr lang="en-US" b="1" dirty="0"/>
+            <a:endParaRPr lang="en-US" b="1" u="sng" dirty="0"/>
           </a:p>
         </p:txBody>
       </p:sp>
@@ -10005,33 +9984,15 @@
             <a:pPr lvl="1"/>
             <a:r>
               <a:rPr lang="en-US" sz="2400" dirty="0" smtClean="0"/>
-              <a:t>PI Meeting – 90 days: </a:t>
-            </a:r>
+              <a:t>PI Meeting – 90 days: Beta Period Begins</a:t>
+            </a:r>
+          </a:p>
+          <a:p>
+            <a:pPr lvl="1"/>
             <a:r>
               <a:rPr lang="en-US" sz="2400" dirty="0" smtClean="0"/>
-              <a:t>Beta </a:t>
-            </a:r>
-            <a:r>
-              <a:rPr lang="en-US" sz="2400" dirty="0" smtClean="0"/>
-              <a:t>Period Begins</a:t>
-            </a:r>
-            <a:endParaRPr lang="en-US" sz="2400" dirty="0" smtClean="0"/>
-          </a:p>
-          <a:p>
-            <a:pPr lvl="1"/>
-            <a:r>
-              <a:rPr lang="en-US" sz="2400" dirty="0" smtClean="0"/>
-              <a:t>PI Meeting – 45 days: </a:t>
-            </a:r>
-            <a:r>
-              <a:rPr lang="en-US" sz="2400" dirty="0" smtClean="0"/>
-              <a:t>Final Deadline for CP6 and CP7 </a:t>
-            </a:r>
-            <a:r>
-              <a:rPr lang="en-US" sz="2400" dirty="0" smtClean="0"/>
-              <a:t>solutions</a:t>
-            </a:r>
-            <a:endParaRPr lang="en-US" sz="2400" dirty="0" smtClean="0"/>
+              <a:t>PI Meeting – 45 days: Final Deadline for CP6 and CP7 solutions</a:t>
+            </a:r>
           </a:p>
           <a:p>
             <a:pPr lvl="1"/>
@@ -10259,7 +10220,7 @@
             </a:pPr>
             <a:r>
               <a:rPr lang="en-US" sz="2400" u="sng" dirty="0" smtClean="0"/>
-              <a:t>Micro-breakout ??? at ???</a:t>
+              <a:t>Micro-breakout today at 1:30pm</a:t>
             </a:r>
             <a:endParaRPr lang="en-US" sz="2400" dirty="0"/>
           </a:p>
@@ -10419,13 +10380,8 @@
           <a:p>
             <a:r>
               <a:rPr lang="en-US" dirty="0" smtClean="0"/>
-              <a:t>CP10: </a:t>
-            </a:r>
-            <a:r>
-              <a:rPr lang="en-US" dirty="0" smtClean="0"/>
-              <a:t>Exploratory Data Analysis Hackathon??</a:t>
-            </a:r>
-            <a:endParaRPr lang="en-US" dirty="0" smtClean="0"/>
+              <a:t>CP10: Exploratory Data Analysis Hackathon??</a:t>
+            </a:r>
           </a:p>
           <a:p>
             <a:endParaRPr lang="en-US" dirty="0"/>
@@ -10435,8 +10391,8 @@
               <a:buNone/>
             </a:pPr>
             <a:r>
-              <a:rPr lang="en-US" dirty="0" smtClean="0"/>
-              <a:t>Micro-Breakout ?? at ??</a:t>
+              <a:rPr lang="en-US" smtClean="0"/>
+              <a:t>Micro-Breakout Monday at 1:30pm</a:t>
             </a:r>
             <a:endParaRPr lang="en-US" dirty="0"/>
           </a:p>
@@ -10737,13 +10693,7 @@
               <a:rPr lang="en-US" sz="2000" dirty="0" smtClean="0">
                 <a:hlinkClick r:id="rId4"/>
               </a:rPr>
-              <a:t>https://</a:t>
-            </a:r>
-            <a:r>
-              <a:rPr lang="en-US" sz="2000" dirty="0" smtClean="0">
-                <a:hlinkClick r:id="rId4"/>
-              </a:rPr>
-              <a:t>www.tfaforms.com/406358</a:t>
+              <a:t>https://www.tfaforms.com/406358</a:t>
             </a:r>
             <a:endParaRPr lang="en-US" sz="2000" dirty="0"/>
           </a:p>

</xml_diff>